<commit_message>
Added final revision of presentation
</commit_message>
<xml_diff>
--- a/comp_analy_deconv_diffuser_20220508_rev1.pptx
+++ b/comp_analy_deconv_diffuser_20220508_rev1.pptx
@@ -11466,8 +11466,12 @@
           </a:p>
           <a:p>
             <a:r>
+              <a:rPr lang="en-US"/>
+              <a:t>BME690</a:t>
+            </a:r>
+            <a:r>
               <a:rPr lang="en-US" dirty="0"/>
-              <a:t>EECS590, Ray Duran</a:t>
+              <a:t>, Ray Duran</a:t>
             </a:r>
           </a:p>
           <a:p>

</xml_diff>